<commit_message>
Minha parte foi incluída na apresentação: - Inline Assembly: OK - Modelos de memória: Quase OK hehe talvez eu ainda altere algo ou acrescente, o que acham? Falow!
</commit_message>
<xml_diff>
--- a/seminario/Interface entre C e Assemby 8085.pptx
+++ b/seminario/Interface entre C e Assemby 8085.pptx
@@ -5,7 +5,7 @@
     <p:sldMasterId id="2147483772" r:id="rId1"/>
   </p:sldMasterIdLst>
   <p:notesMasterIdLst>
-    <p:notesMasterId r:id="rId20"/>
+    <p:notesMasterId r:id="rId21"/>
   </p:notesMasterIdLst>
   <p:sldIdLst>
     <p:sldId id="256" r:id="rId2"/>
@@ -21,11 +21,12 @@
     <p:sldId id="300" r:id="rId12"/>
     <p:sldId id="301" r:id="rId13"/>
     <p:sldId id="302" r:id="rId14"/>
-    <p:sldId id="303" r:id="rId15"/>
-    <p:sldId id="304" r:id="rId16"/>
-    <p:sldId id="297" r:id="rId17"/>
-    <p:sldId id="305" r:id="rId18"/>
-    <p:sldId id="289" r:id="rId19"/>
+    <p:sldId id="310" r:id="rId15"/>
+    <p:sldId id="311" r:id="rId16"/>
+    <p:sldId id="312" r:id="rId17"/>
+    <p:sldId id="297" r:id="rId18"/>
+    <p:sldId id="305" r:id="rId19"/>
+    <p:sldId id="289" r:id="rId20"/>
   </p:sldIdLst>
   <p:sldSz cx="9144000" cy="6858000" type="screen4x3"/>
   <p:notesSz cx="6858000" cy="9144000"/>
@@ -210,7 +211,7 @@
             <a:fld id="{0202AF00-0D92-4FB3-BF30-0E1262BA24CF}" type="datetimeFigureOut">
               <a:rPr lang="pt-BR" smtClean="0"/>
               <a:pPr/>
-              <a:t>30/11/2011</a:t>
+              <a:t>01/12/2011</a:t>
             </a:fld>
             <a:endParaRPr lang="pt-BR"/>
           </a:p>
@@ -381,7 +382,7 @@
     </p:spTree>
     <p:extLst>
       <p:ext uri="{BB962C8B-B14F-4D97-AF65-F5344CB8AC3E}">
-        <p14:creationId xmlns:p14="http://schemas.microsoft.com/office/powerpoint/2010/main" xmlns="" val="3517328007"/>
+        <p14:creationId xmlns="" xmlns:p14="http://schemas.microsoft.com/office/powerpoint/2010/main" val="3517328007"/>
       </p:ext>
     </p:extLst>
   </p:cSld>
@@ -676,7 +677,7 @@
             <a:fld id="{7BE08B6B-564C-4EB5-BE5C-0142EA1AA5D2}" type="datetimeFigureOut">
               <a:rPr lang="pt-BR" smtClean="0"/>
               <a:pPr/>
-              <a:t>30/11/2011</a:t>
+              <a:t>01/12/2011</a:t>
             </a:fld>
             <a:endParaRPr lang="pt-BR"/>
           </a:p>
@@ -850,7 +851,7 @@
             <a:fld id="{7BE08B6B-564C-4EB5-BE5C-0142EA1AA5D2}" type="datetimeFigureOut">
               <a:rPr lang="pt-BR" smtClean="0"/>
               <a:pPr/>
-              <a:t>30/11/2011</a:t>
+              <a:t>01/12/2011</a:t>
             </a:fld>
             <a:endParaRPr lang="pt-BR"/>
           </a:p>
@@ -1034,7 +1035,7 @@
             <a:fld id="{7BE08B6B-564C-4EB5-BE5C-0142EA1AA5D2}" type="datetimeFigureOut">
               <a:rPr lang="pt-BR" smtClean="0"/>
               <a:pPr/>
-              <a:t>30/11/2011</a:t>
+              <a:t>01/12/2011</a:t>
             </a:fld>
             <a:endParaRPr lang="pt-BR"/>
           </a:p>
@@ -1208,7 +1209,7 @@
             <a:fld id="{7BE08B6B-564C-4EB5-BE5C-0142EA1AA5D2}" type="datetimeFigureOut">
               <a:rPr lang="pt-BR" smtClean="0"/>
               <a:pPr/>
-              <a:t>30/11/2011</a:t>
+              <a:t>01/12/2011</a:t>
             </a:fld>
             <a:endParaRPr lang="pt-BR"/>
           </a:p>
@@ -1458,7 +1459,7 @@
             <a:fld id="{7BE08B6B-564C-4EB5-BE5C-0142EA1AA5D2}" type="datetimeFigureOut">
               <a:rPr lang="pt-BR" smtClean="0"/>
               <a:pPr/>
-              <a:t>30/11/2011</a:t>
+              <a:t>01/12/2011</a:t>
             </a:fld>
             <a:endParaRPr lang="pt-BR"/>
           </a:p>
@@ -1750,7 +1751,7 @@
             <a:fld id="{7BE08B6B-564C-4EB5-BE5C-0142EA1AA5D2}" type="datetimeFigureOut">
               <a:rPr lang="pt-BR" smtClean="0"/>
               <a:pPr/>
-              <a:t>30/11/2011</a:t>
+              <a:t>01/12/2011</a:t>
             </a:fld>
             <a:endParaRPr lang="pt-BR"/>
           </a:p>
@@ -2188,7 +2189,7 @@
             <a:fld id="{7BE08B6B-564C-4EB5-BE5C-0142EA1AA5D2}" type="datetimeFigureOut">
               <a:rPr lang="pt-BR" smtClean="0"/>
               <a:pPr/>
-              <a:t>30/11/2011</a:t>
+              <a:t>01/12/2011</a:t>
             </a:fld>
             <a:endParaRPr lang="pt-BR"/>
           </a:p>
@@ -2310,7 +2311,7 @@
             <a:fld id="{7BE08B6B-564C-4EB5-BE5C-0142EA1AA5D2}" type="datetimeFigureOut">
               <a:rPr lang="pt-BR" smtClean="0"/>
               <a:pPr/>
-              <a:t>30/11/2011</a:t>
+              <a:t>01/12/2011</a:t>
             </a:fld>
             <a:endParaRPr lang="pt-BR"/>
           </a:p>
@@ -2409,7 +2410,7 @@
             <a:fld id="{7BE08B6B-564C-4EB5-BE5C-0142EA1AA5D2}" type="datetimeFigureOut">
               <a:rPr lang="pt-BR" smtClean="0"/>
               <a:pPr/>
-              <a:t>30/11/2011</a:t>
+              <a:t>01/12/2011</a:t>
             </a:fld>
             <a:endParaRPr lang="pt-BR"/>
           </a:p>
@@ -2607,7 +2608,7 @@
             <a:fld id="{7BE08B6B-564C-4EB5-BE5C-0142EA1AA5D2}" type="datetimeFigureOut">
               <a:rPr lang="pt-BR" smtClean="0"/>
               <a:pPr/>
-              <a:t>30/11/2011</a:t>
+              <a:t>01/12/2011</a:t>
             </a:fld>
             <a:endParaRPr lang="pt-BR"/>
           </a:p>
@@ -2934,7 +2935,7 @@
             <a:fld id="{7BE08B6B-564C-4EB5-BE5C-0142EA1AA5D2}" type="datetimeFigureOut">
               <a:rPr lang="pt-BR" smtClean="0"/>
               <a:pPr/>
-              <a:t>30/11/2011</a:t>
+              <a:t>01/12/2011</a:t>
             </a:fld>
             <a:endParaRPr lang="pt-BR"/>
           </a:p>
@@ -3323,7 +3324,7 @@
             <a:fld id="{7BE08B6B-564C-4EB5-BE5C-0142EA1AA5D2}" type="datetimeFigureOut">
               <a:rPr lang="pt-BR" smtClean="0"/>
               <a:pPr/>
-              <a:t>30/11/2011</a:t>
+              <a:t>01/12/2011</a:t>
             </a:fld>
             <a:endParaRPr lang="pt-BR"/>
           </a:p>
@@ -3847,7 +3848,7 @@
     <a:masterClrMapping/>
   </p:clrMapOvr>
   <mc:AlternateContent xmlns:mc="http://schemas.openxmlformats.org/markup-compatibility/2006">
-    <mc:Choice xmlns:p14="http://schemas.microsoft.com/office/powerpoint/2010/main" xmlns="" Requires="p14">
+    <mc:Choice xmlns="" xmlns:p14="http://schemas.microsoft.com/office/powerpoint/2010/main" Requires="p14">
       <p:transition spd="med" p14:dur="700">
         <p:fade/>
       </p:transition>
@@ -4024,7 +4025,7 @@
     </p:spTree>
     <p:extLst>
       <p:ext uri="{BB962C8B-B14F-4D97-AF65-F5344CB8AC3E}">
-        <p14:creationId xmlns:p14="http://schemas.microsoft.com/office/powerpoint/2010/main" xmlns="" val="3419028655"/>
+        <p14:creationId xmlns="" xmlns:p14="http://schemas.microsoft.com/office/powerpoint/2010/main" val="3419028655"/>
       </p:ext>
     </p:extLst>
   </p:cSld>
@@ -4119,7 +4120,7 @@
     </p:spTree>
     <p:extLst>
       <p:ext uri="{BB962C8B-B14F-4D97-AF65-F5344CB8AC3E}">
-        <p14:creationId xmlns:p14="http://schemas.microsoft.com/office/powerpoint/2010/main" xmlns="" val="631104269"/>
+        <p14:creationId xmlns="" xmlns:p14="http://schemas.microsoft.com/office/powerpoint/2010/main" val="631104269"/>
       </p:ext>
     </p:extLst>
   </p:cSld>
@@ -4206,7 +4207,7 @@
     </p:spTree>
     <p:extLst>
       <p:ext uri="{BB962C8B-B14F-4D97-AF65-F5344CB8AC3E}">
-        <p14:creationId xmlns:p14="http://schemas.microsoft.com/office/powerpoint/2010/main" xmlns="" val="1011183347"/>
+        <p14:creationId xmlns="" xmlns:p14="http://schemas.microsoft.com/office/powerpoint/2010/main" val="1011183347"/>
       </p:ext>
     </p:extLst>
   </p:cSld>
@@ -4293,7 +4294,7 @@
     </p:spTree>
     <p:extLst>
       <p:ext uri="{BB962C8B-B14F-4D97-AF65-F5344CB8AC3E}">
-        <p14:creationId xmlns:p14="http://schemas.microsoft.com/office/powerpoint/2010/main" xmlns="" val="633472005"/>
+        <p14:creationId xmlns="" xmlns:p14="http://schemas.microsoft.com/office/powerpoint/2010/main" val="633472005"/>
       </p:ext>
     </p:extLst>
   </p:cSld>
@@ -4377,8 +4378,215 @@
           <a:p>
             <a:r>
               <a:rPr lang="pt-BR" dirty="0" smtClean="0"/>
-              <a:t>Código exemplo</a:t>
-            </a:r>
+              <a:t>Introdução</a:t>
+            </a:r>
+          </a:p>
+          <a:p>
+            <a:pPr>
+              <a:buNone/>
+            </a:pPr>
+            <a:endParaRPr lang="pt-BR" dirty="0" smtClean="0"/>
+          </a:p>
+          <a:p>
+            <a:r>
+              <a:rPr lang="pt-BR" dirty="0" smtClean="0"/>
+              <a:t>Codificação </a:t>
+            </a:r>
+            <a:r>
+              <a:rPr lang="pt-BR" dirty="0" smtClean="0"/>
+              <a:t>básica para GCC</a:t>
+            </a:r>
+          </a:p>
+          <a:p>
+            <a:pPr lvl="1"/>
+            <a:r>
+              <a:rPr lang="pt-BR" dirty="0" smtClean="0"/>
+              <a:t>Sintaxe: AT&amp;T</a:t>
+            </a:r>
+          </a:p>
+          <a:p>
+            <a:pPr lvl="1"/>
+            <a:r>
+              <a:rPr lang="pt-BR" dirty="0" smtClean="0"/>
+              <a:t>Exemplo: </a:t>
+            </a:r>
+          </a:p>
+          <a:p>
+            <a:pPr lvl="2">
+              <a:buNone/>
+            </a:pPr>
+            <a:r>
+              <a:rPr lang="pt-BR" dirty="0" smtClean="0"/>
+              <a:t>	__</a:t>
+            </a:r>
+            <a:r>
+              <a:rPr lang="pt-BR" dirty="0" err="1" smtClean="0"/>
+              <a:t>asm__</a:t>
+            </a:r>
+            <a:r>
+              <a:rPr lang="pt-BR" dirty="0" smtClean="0"/>
+              <a:t> ("</a:t>
+            </a:r>
+            <a:r>
+              <a:rPr lang="pt-BR" dirty="0" err="1" smtClean="0"/>
+              <a:t>movl</a:t>
+            </a:r>
+            <a:r>
+              <a:rPr lang="pt-BR" dirty="0" smtClean="0"/>
+              <a:t> %</a:t>
+            </a:r>
+            <a:r>
+              <a:rPr lang="pt-BR" dirty="0" err="1" smtClean="0"/>
+              <a:t>eax</a:t>
+            </a:r>
+            <a:r>
+              <a:rPr lang="pt-BR" dirty="0" smtClean="0"/>
+              <a:t>, %</a:t>
+            </a:r>
+            <a:r>
+              <a:rPr lang="pt-BR" dirty="0" err="1" smtClean="0"/>
+              <a:t>ebx</a:t>
+            </a:r>
+            <a:r>
+              <a:rPr lang="pt-BR" dirty="0" smtClean="0"/>
+              <a:t>\n\t" </a:t>
+            </a:r>
+          </a:p>
+          <a:p>
+            <a:pPr lvl="2">
+              <a:buNone/>
+            </a:pPr>
+            <a:r>
+              <a:rPr lang="pt-BR" dirty="0" smtClean="0"/>
+              <a:t>		   "</a:t>
+            </a:r>
+            <a:r>
+              <a:rPr lang="pt-BR" dirty="0" err="1" smtClean="0"/>
+              <a:t>movl</a:t>
+            </a:r>
+            <a:r>
+              <a:rPr lang="pt-BR" dirty="0" smtClean="0"/>
+              <a:t> $56, %</a:t>
+            </a:r>
+            <a:r>
+              <a:rPr lang="pt-BR" dirty="0" err="1" smtClean="0"/>
+              <a:t>esi</a:t>
+            </a:r>
+            <a:r>
+              <a:rPr lang="pt-BR" dirty="0" smtClean="0"/>
+              <a:t>\n\t“</a:t>
+            </a:r>
+          </a:p>
+          <a:p>
+            <a:pPr lvl="2">
+              <a:buNone/>
+            </a:pPr>
+            <a:r>
+              <a:rPr lang="pt-BR" dirty="0" smtClean="0"/>
+              <a:t>		   "</a:t>
+            </a:r>
+            <a:r>
+              <a:rPr lang="pt-BR" dirty="0" err="1" smtClean="0"/>
+              <a:t>movl</a:t>
+            </a:r>
+            <a:r>
+              <a:rPr lang="pt-BR" dirty="0" smtClean="0"/>
+              <a:t> %</a:t>
+            </a:r>
+            <a:r>
+              <a:rPr lang="pt-BR" dirty="0" err="1" smtClean="0"/>
+              <a:t>ecx</a:t>
+            </a:r>
+            <a:r>
+              <a:rPr lang="pt-BR" dirty="0" smtClean="0"/>
+              <a:t>, $</a:t>
+            </a:r>
+            <a:r>
+              <a:rPr lang="pt-BR" dirty="0" err="1" smtClean="0"/>
+              <a:t>label</a:t>
+            </a:r>
+            <a:r>
+              <a:rPr lang="pt-BR" dirty="0" smtClean="0"/>
+              <a:t>(%</a:t>
+            </a:r>
+            <a:r>
+              <a:rPr lang="pt-BR" dirty="0" err="1" smtClean="0"/>
+              <a:t>edx</a:t>
+            </a:r>
+            <a:r>
+              <a:rPr lang="pt-BR" dirty="0" smtClean="0"/>
+              <a:t>,%</a:t>
+            </a:r>
+            <a:r>
+              <a:rPr lang="pt-BR" dirty="0" err="1" smtClean="0"/>
+              <a:t>ebx</a:t>
+            </a:r>
+            <a:r>
+              <a:rPr lang="pt-BR" dirty="0" smtClean="0"/>
+              <a:t>,$4)\n\t”</a:t>
+            </a:r>
+          </a:p>
+          <a:p>
+            <a:pPr lvl="2">
+              <a:buNone/>
+            </a:pPr>
+            <a:r>
+              <a:rPr lang="pt-BR" dirty="0" smtClean="0"/>
+              <a:t>		   "</a:t>
+            </a:r>
+            <a:r>
+              <a:rPr lang="pt-BR" dirty="0" err="1" smtClean="0"/>
+              <a:t>movb</a:t>
+            </a:r>
+            <a:r>
+              <a:rPr lang="pt-BR" dirty="0" smtClean="0"/>
+              <a:t> %ah, (%</a:t>
+            </a:r>
+            <a:r>
+              <a:rPr lang="pt-BR" dirty="0" err="1" smtClean="0"/>
+              <a:t>ebx</a:t>
+            </a:r>
+            <a:r>
+              <a:rPr lang="pt-BR" dirty="0" smtClean="0"/>
+              <a:t>)");</a:t>
+            </a:r>
+          </a:p>
+          <a:p>
+            <a:pPr lvl="2">
+              <a:buNone/>
+            </a:pPr>
+            <a:endParaRPr lang="pt-BR" dirty="0" smtClean="0"/>
+          </a:p>
+          <a:p>
+            <a:r>
+              <a:rPr lang="pt-BR" dirty="0" smtClean="0"/>
+              <a:t>Extensão</a:t>
+            </a:r>
+          </a:p>
+          <a:p>
+            <a:pPr lvl="1"/>
+            <a:r>
+              <a:rPr lang="pt-BR" dirty="0" smtClean="0"/>
+              <a:t>Como definir as variáveis de entrada e saída (interface com C)</a:t>
+            </a:r>
+          </a:p>
+          <a:p>
+            <a:pPr lvl="1"/>
+            <a:r>
+              <a:rPr lang="pt-BR" dirty="0" smtClean="0"/>
+              <a:t>Como indicar como essas variáveis serão usadas em </a:t>
+            </a:r>
+            <a:r>
+              <a:rPr lang="pt-BR" dirty="0" err="1" smtClean="0"/>
+              <a:t>assembly</a:t>
+            </a:r>
+            <a:endParaRPr lang="pt-BR" dirty="0" smtClean="0"/>
+          </a:p>
+          <a:p>
+            <a:pPr lvl="2">
+              <a:buNone/>
+            </a:pPr>
+            <a:endParaRPr lang="pt-BR" dirty="0" smtClean="0"/>
           </a:p>
           <a:p>
             <a:endParaRPr lang="pt-BR" dirty="0" smtClean="0"/>
@@ -4438,8 +4646,16 @@
           <a:lstStyle/>
           <a:p>
             <a:r>
+              <a:rPr lang="pt-BR" sz="4000" dirty="0" err="1" smtClean="0"/>
+              <a:t>Inline</a:t>
+            </a:r>
+            <a:r>
               <a:rPr lang="pt-BR" sz="4000" dirty="0" smtClean="0"/>
-              <a:t>Modelos de memória</a:t>
+              <a:t> </a:t>
+            </a:r>
+            <a:r>
+              <a:rPr lang="pt-BR" sz="4000" dirty="0" err="1" smtClean="0"/>
+              <a:t>assembly</a:t>
             </a:r>
             <a:endParaRPr lang="en-US" sz="4000" dirty="0"/>
           </a:p>
@@ -4458,139 +4674,261 @@
         <p:spPr/>
         <p:txBody>
           <a:bodyPr>
-            <a:normAutofit fontScale="92500" lnSpcReduction="20000"/>
+            <a:normAutofit/>
           </a:bodyPr>
           <a:lstStyle/>
           <a:p>
             <a:r>
               <a:rPr lang="pt-BR" dirty="0" smtClean="0"/>
-              <a:t>O que são os modelos de memória</a:t>
-            </a:r>
-          </a:p>
-          <a:p>
-            <a:endParaRPr lang="pt-BR" dirty="0"/>
-          </a:p>
-          <a:p>
-            <a:r>
-              <a:rPr lang="pt-BR" dirty="0" smtClean="0"/>
-              <a:t>Quando usar um ou outro</a:t>
-            </a:r>
-          </a:p>
-          <a:p>
-            <a:endParaRPr lang="pt-BR" dirty="0"/>
-          </a:p>
-          <a:p>
-            <a:r>
-              <a:rPr lang="pt-BR" dirty="0" smtClean="0"/>
-              <a:t>Misturar modelos de memória – cláusulas </a:t>
-            </a:r>
+              <a:t>Extensão (continuação)</a:t>
+            </a:r>
+          </a:p>
+          <a:p>
+            <a:pPr lvl="1"/>
+            <a:r>
+              <a:rPr lang="pt-BR" dirty="0" smtClean="0"/>
+              <a:t>Campos: </a:t>
+            </a:r>
+            <a:r>
+              <a:rPr lang="pt-BR" i="1" dirty="0" err="1" smtClean="0"/>
+              <a:t>assembly</a:t>
+            </a:r>
+            <a:r>
+              <a:rPr lang="pt-BR" i="1" dirty="0" smtClean="0"/>
+              <a:t> </a:t>
+            </a:r>
+            <a:r>
+              <a:rPr lang="pt-BR" i="1" dirty="0" err="1" smtClean="0"/>
+              <a:t>template</a:t>
+            </a:r>
+            <a:r>
+              <a:rPr lang="pt-BR" dirty="0" smtClean="0"/>
+              <a:t>, saída, entrada e registradores utilizados</a:t>
+            </a:r>
+          </a:p>
+          <a:p>
+            <a:pPr lvl="1"/>
             <a:r>
               <a:rPr lang="pt-BR" dirty="0" err="1" smtClean="0"/>
-              <a:t>tiny</a:t>
-            </a:r>
-            <a:r>
-              <a:rPr lang="pt-BR" dirty="0" smtClean="0"/>
-              <a:t>, </a:t>
+              <a:t>Operandos</a:t>
+            </a:r>
+            <a:r>
+              <a:rPr lang="pt-BR" dirty="0" smtClean="0"/>
+              <a:t>: associados a variáveis em C</a:t>
+            </a:r>
+            <a:endParaRPr lang="pt-BR" dirty="0" smtClean="0"/>
+          </a:p>
+          <a:p>
+            <a:pPr lvl="1"/>
+            <a:r>
+              <a:rPr lang="pt-BR" dirty="0" smtClean="0"/>
+              <a:t>Restrições: r, =r, a,b,c,...,m, ..., número</a:t>
+            </a:r>
+          </a:p>
+          <a:p>
+            <a:pPr lvl="1"/>
+            <a:r>
+              <a:rPr lang="pt-BR" dirty="0" smtClean="0"/>
+              <a:t>Exemplo:</a:t>
+            </a:r>
+          </a:p>
+          <a:p>
+            <a:pPr lvl="1">
+              <a:buNone/>
+            </a:pPr>
+            <a:r>
+              <a:rPr lang="pt-BR" dirty="0" smtClean="0"/>
+              <a:t>			</a:t>
             </a:r>
             <a:r>
               <a:rPr lang="pt-BR" dirty="0" err="1" smtClean="0"/>
-              <a:t>small</a:t>
-            </a:r>
-            <a:r>
-              <a:rPr lang="pt-BR" dirty="0" smtClean="0"/>
-              <a:t>, </a:t>
+              <a:t>int</a:t>
+            </a:r>
+            <a:r>
+              <a:rPr lang="pt-BR" dirty="0" smtClean="0"/>
+              <a:t> </a:t>
+            </a:r>
+            <a:r>
+              <a:rPr lang="pt-BR" dirty="0" smtClean="0"/>
+              <a:t>a=10, b; </a:t>
+            </a:r>
+            <a:endParaRPr lang="pt-BR" dirty="0" smtClean="0"/>
+          </a:p>
+          <a:p>
+            <a:pPr lvl="1">
+              <a:buNone/>
+            </a:pPr>
+            <a:r>
+              <a:rPr lang="pt-BR" dirty="0" smtClean="0"/>
+              <a:t>	</a:t>
+            </a:r>
+            <a:r>
+              <a:rPr lang="pt-BR" dirty="0" smtClean="0"/>
+              <a:t>		</a:t>
             </a:r>
             <a:r>
               <a:rPr lang="pt-BR" dirty="0" err="1" smtClean="0"/>
-              <a:t>medium</a:t>
-            </a:r>
-            <a:r>
-              <a:rPr lang="pt-BR" dirty="0" smtClean="0"/>
-              <a:t>, </a:t>
+              <a:t>asm</a:t>
+            </a:r>
+            <a:r>
+              <a:rPr lang="pt-BR" dirty="0" smtClean="0"/>
+              <a:t> 	(“</a:t>
             </a:r>
             <a:r>
               <a:rPr lang="pt-BR" dirty="0" err="1" smtClean="0"/>
-              <a:t>compact</a:t>
-            </a:r>
-            <a:r>
-              <a:rPr lang="pt-BR" dirty="0" smtClean="0"/>
-              <a:t>, </a:t>
+              <a:t>movl</a:t>
+            </a:r>
+            <a:r>
+              <a:rPr lang="pt-BR" dirty="0" smtClean="0"/>
+              <a:t> </a:t>
+            </a:r>
+            <a:r>
+              <a:rPr lang="pt-BR" dirty="0" smtClean="0"/>
+              <a:t>%1, %%</a:t>
             </a:r>
             <a:r>
               <a:rPr lang="pt-BR" dirty="0" err="1" smtClean="0"/>
-              <a:t>large</a:t>
+              <a:t>eax</a:t>
+            </a:r>
+            <a:r>
+              <a:rPr lang="pt-BR" dirty="0" smtClean="0"/>
+              <a:t>;</a:t>
+            </a:r>
+          </a:p>
+          <a:p>
+            <a:pPr lvl="1">
+              <a:buNone/>
+            </a:pPr>
+            <a:r>
+              <a:rPr lang="pt-BR" dirty="0" smtClean="0"/>
+              <a:t>	</a:t>
+            </a:r>
+            <a:r>
+              <a:rPr lang="pt-BR" dirty="0" smtClean="0"/>
+              <a:t>			   </a:t>
+            </a:r>
+            <a:r>
+              <a:rPr lang="pt-BR" dirty="0" err="1" smtClean="0"/>
+              <a:t>movl</a:t>
+            </a:r>
+            <a:r>
+              <a:rPr lang="pt-BR" dirty="0" smtClean="0"/>
+              <a:t> %%</a:t>
+            </a:r>
+            <a:r>
+              <a:rPr lang="pt-BR" dirty="0" err="1" smtClean="0"/>
+              <a:t>eax</a:t>
+            </a:r>
+            <a:r>
+              <a:rPr lang="pt-BR" dirty="0" smtClean="0"/>
+              <a:t>, %0</a:t>
+            </a:r>
+            <a:r>
+              <a:rPr lang="pt-BR" dirty="0" smtClean="0"/>
+              <a:t>;”</a:t>
+            </a:r>
+          </a:p>
+          <a:p>
+            <a:pPr lvl="1">
+              <a:buNone/>
+            </a:pPr>
+            <a:r>
+              <a:rPr lang="pt-BR" dirty="0" smtClean="0"/>
+              <a:t>	</a:t>
+            </a:r>
+            <a:r>
+              <a:rPr lang="pt-BR" dirty="0" smtClean="0"/>
+              <a:t>			:"=</a:t>
+            </a:r>
+            <a:r>
+              <a:rPr lang="pt-BR" dirty="0" smtClean="0"/>
+              <a:t>r"(b</a:t>
+            </a:r>
+            <a:r>
+              <a:rPr lang="pt-BR" dirty="0" smtClean="0"/>
+              <a:t>)	/* </a:t>
+            </a:r>
+            <a:r>
+              <a:rPr lang="pt-BR" dirty="0" err="1" smtClean="0"/>
+              <a:t>saida</a:t>
             </a:r>
             <a:r>
               <a:rPr lang="pt-BR" dirty="0" smtClean="0"/>
               <a:t> </a:t>
             </a:r>
             <a:r>
+              <a:rPr lang="pt-BR" dirty="0" smtClean="0"/>
+              <a:t>*/ </a:t>
+            </a:r>
+            <a:endParaRPr lang="pt-BR" dirty="0" smtClean="0"/>
+          </a:p>
+          <a:p>
+            <a:pPr lvl="1">
+              <a:buNone/>
+            </a:pPr>
+            <a:r>
+              <a:rPr lang="pt-BR" dirty="0" smtClean="0"/>
+              <a:t>	</a:t>
+            </a:r>
+            <a:r>
+              <a:rPr lang="pt-BR" dirty="0" smtClean="0"/>
+              <a:t>			:"</a:t>
+            </a:r>
+            <a:r>
+              <a:rPr lang="pt-BR" dirty="0" smtClean="0"/>
+              <a:t>r"(a) </a:t>
+            </a:r>
+            <a:r>
+              <a:rPr lang="pt-BR" dirty="0" smtClean="0"/>
+              <a:t>	/* entrada </a:t>
+            </a:r>
+            <a:r>
+              <a:rPr lang="pt-BR" dirty="0" smtClean="0"/>
+              <a:t>*/ </a:t>
+            </a:r>
+            <a:endParaRPr lang="pt-BR" dirty="0" smtClean="0"/>
+          </a:p>
+          <a:p>
+            <a:pPr lvl="1">
+              <a:buNone/>
+            </a:pPr>
+            <a:r>
+              <a:rPr lang="pt-BR" dirty="0" smtClean="0"/>
+              <a:t>	</a:t>
+            </a:r>
+            <a:r>
+              <a:rPr lang="pt-BR" dirty="0" smtClean="0"/>
+              <a:t>			:"%</a:t>
+            </a:r>
+            <a:r>
               <a:rPr lang="pt-BR" dirty="0" err="1" smtClean="0"/>
-              <a:t>huge</a:t>
+              <a:t>eax</a:t>
+            </a:r>
+            <a:r>
+              <a:rPr lang="pt-BR" dirty="0" smtClean="0"/>
+              <a:t>" </a:t>
+            </a:r>
+            <a:r>
+              <a:rPr lang="pt-BR" dirty="0" smtClean="0"/>
+              <a:t>	/* registradores utilizados </a:t>
+            </a:r>
+            <a:r>
+              <a:rPr lang="pt-BR" dirty="0" smtClean="0"/>
+              <a:t>*/  </a:t>
+            </a:r>
+            <a:r>
+              <a:rPr lang="pt-BR" dirty="0" smtClean="0"/>
+              <a:t>); </a:t>
             </a:r>
             <a:endParaRPr lang="pt-BR" dirty="0" smtClean="0"/>
           </a:p>
           <a:p>
-            <a:endParaRPr lang="pt-BR" dirty="0"/>
-          </a:p>
-          <a:p>
-            <a:r>
-              <a:rPr lang="pt-BR" dirty="0" smtClean="0"/>
-              <a:t>Fontes: </a:t>
-            </a:r>
-          </a:p>
-          <a:p>
-            <a:r>
-              <a:rPr lang="en-US" dirty="0">
-                <a:hlinkClick r:id="rId2"/>
-              </a:rPr>
-              <a:t>http://</a:t>
-            </a:r>
-            <a:r>
-              <a:rPr lang="en-US" dirty="0" smtClean="0">
-                <a:hlinkClick r:id="rId2"/>
-              </a:rPr>
-              <a:t>www.esacademy.com/en/library/technical-articles-and-documents/8051-programming/8051-memory-configurations-with-c-compilers.html</a:t>
-            </a:r>
-            <a:endParaRPr lang="en-US" dirty="0" smtClean="0"/>
-          </a:p>
-          <a:p>
-            <a:r>
-              <a:rPr lang="en-US" dirty="0">
-                <a:hlinkClick r:id="rId3"/>
-              </a:rPr>
-              <a:t>http://</a:t>
-            </a:r>
-            <a:r>
-              <a:rPr lang="en-US" dirty="0" smtClean="0">
-                <a:hlinkClick r:id="rId3"/>
-              </a:rPr>
-              <a:t>www.keil.com/support/docs/995.htm</a:t>
-            </a:r>
-            <a:endParaRPr lang="en-US" dirty="0" smtClean="0"/>
-          </a:p>
-          <a:p>
-            <a:r>
-              <a:rPr lang="en-US" dirty="0">
-                <a:hlinkClick r:id="rId4"/>
-              </a:rPr>
-              <a:t>http://</a:t>
-            </a:r>
-            <a:r>
-              <a:rPr lang="en-US" dirty="0" smtClean="0">
-                <a:hlinkClick r:id="rId4"/>
-              </a:rPr>
-              <a:t>www.digitalmars.com/ctg/ctgMemoryModel.html</a:t>
-            </a:r>
-            <a:endParaRPr lang="en-US" dirty="0" smtClean="0"/>
-          </a:p>
-          <a:p>
-            <a:r>
-              <a:rPr lang="en-US" dirty="0">
-                <a:hlinkClick r:id="rId5"/>
-              </a:rPr>
-              <a:t>http://infocenter.arm.com/help/index.jsp?topic=/com.arm.doc.faqs/ka9553.html</a:t>
-            </a:r>
+            <a:pPr lvl="2">
+              <a:buNone/>
+            </a:pPr>
+            <a:endParaRPr lang="pt-BR" dirty="0" smtClean="0"/>
+          </a:p>
+          <a:p>
             <a:endParaRPr lang="pt-BR" dirty="0" smtClean="0"/>
           </a:p>
         </p:txBody>
@@ -4598,7 +4936,7 @@
     </p:spTree>
     <p:extLst>
       <p:ext uri="{BB962C8B-B14F-4D97-AF65-F5344CB8AC3E}">
-        <p14:creationId xmlns:p14="http://schemas.microsoft.com/office/powerpoint/2010/main" xmlns="" val="1443271526"/>
+        <p14:creationId xmlns:p14="http://schemas.microsoft.com/office/powerpoint/2010/main" xmlns="" val="1565328756"/>
       </p:ext>
     </p:extLst>
   </p:cSld>
@@ -4634,7 +4972,7 @@
       </p:grpSpPr>
       <p:sp>
         <p:nvSpPr>
-          <p:cNvPr id="4" name="Title 3"/>
+          <p:cNvPr id="2" name="Title 1"/>
           <p:cNvSpPr>
             <a:spLocks noGrp="1"/>
           </p:cNvSpPr>
@@ -4648,36 +4986,313 @@
           <a:lstStyle/>
           <a:p>
             <a:r>
-              <a:rPr lang="pt-BR" dirty="0" smtClean="0"/>
-              <a:t>conclusão</a:t>
-            </a:r>
-            <a:endParaRPr lang="en-US" dirty="0"/>
-          </a:p>
-        </p:txBody>
-      </p:sp>
-      <p:sp>
-        <p:nvSpPr>
-          <p:cNvPr id="5" name="Text Placeholder 4"/>
-          <p:cNvSpPr>
-            <a:spLocks noGrp="1"/>
-          </p:cNvSpPr>
-          <p:nvPr>
-            <p:ph type="body" idx="1"/>
+              <a:rPr lang="pt-BR" sz="4000" dirty="0" smtClean="0"/>
+              <a:t>Modelos de memória</a:t>
+            </a:r>
+            <a:endParaRPr lang="en-US" sz="4000" dirty="0"/>
+          </a:p>
+        </p:txBody>
+      </p:sp>
+      <p:sp>
+        <p:nvSpPr>
+          <p:cNvPr id="3" name="Content Placeholder 2"/>
+          <p:cNvSpPr>
+            <a:spLocks noGrp="1"/>
+          </p:cNvSpPr>
+          <p:nvPr>
+            <p:ph idx="1"/>
           </p:nvPr>
         </p:nvSpPr>
         <p:spPr/>
         <p:txBody>
-          <a:bodyPr/>
-          <a:lstStyle/>
-          <a:p>
-            <a:endParaRPr lang="en-US"/>
+          <a:bodyPr>
+            <a:normAutofit fontScale="92500" lnSpcReduction="10000"/>
+          </a:bodyPr>
+          <a:lstStyle/>
+          <a:p>
+            <a:r>
+              <a:rPr lang="pt-BR" dirty="0" smtClean="0"/>
+              <a:t>O que </a:t>
+            </a:r>
+            <a:r>
+              <a:rPr lang="pt-BR" dirty="0" smtClean="0"/>
+              <a:t>são?</a:t>
+            </a:r>
+            <a:endParaRPr lang="pt-BR" dirty="0" smtClean="0"/>
+          </a:p>
+          <a:p>
+            <a:endParaRPr lang="pt-BR" dirty="0"/>
+          </a:p>
+          <a:p>
+            <a:r>
+              <a:rPr lang="pt-BR" dirty="0" smtClean="0"/>
+              <a:t>Qual usar?</a:t>
+            </a:r>
+            <a:endParaRPr lang="pt-BR" dirty="0" smtClean="0"/>
+          </a:p>
+          <a:p>
+            <a:pPr>
+              <a:buNone/>
+            </a:pPr>
+            <a:endParaRPr lang="pt-BR" dirty="0" smtClean="0"/>
+          </a:p>
+          <a:p>
+            <a:pPr>
+              <a:buNone/>
+            </a:pPr>
+            <a:endParaRPr lang="pt-BR" dirty="0" smtClean="0"/>
+          </a:p>
+          <a:p>
+            <a:pPr>
+              <a:buNone/>
+            </a:pPr>
+            <a:endParaRPr lang="pt-BR" dirty="0" smtClean="0"/>
+          </a:p>
+          <a:p>
+            <a:endParaRPr lang="pt-BR" dirty="0" smtClean="0"/>
+          </a:p>
+          <a:p>
+            <a:pPr>
+              <a:buNone/>
+            </a:pPr>
+            <a:endParaRPr lang="pt-BR" dirty="0"/>
+          </a:p>
+          <a:p>
+            <a:r>
+              <a:rPr lang="pt-BR" dirty="0" smtClean="0"/>
+              <a:t>Misturar modelos de memória – cláusulas </a:t>
+            </a:r>
+            <a:r>
+              <a:rPr lang="pt-BR" dirty="0" err="1" smtClean="0"/>
+              <a:t>tiny</a:t>
+            </a:r>
+            <a:r>
+              <a:rPr lang="pt-BR" dirty="0" smtClean="0"/>
+              <a:t>, small, </a:t>
+            </a:r>
+            <a:r>
+              <a:rPr lang="pt-BR" dirty="0" err="1" smtClean="0"/>
+              <a:t>medium</a:t>
+            </a:r>
+            <a:r>
+              <a:rPr lang="pt-BR" dirty="0" smtClean="0"/>
+              <a:t>, </a:t>
+            </a:r>
+            <a:r>
+              <a:rPr lang="pt-BR" dirty="0" err="1" smtClean="0"/>
+              <a:t>compact</a:t>
+            </a:r>
+            <a:r>
+              <a:rPr lang="pt-BR" dirty="0" smtClean="0"/>
+              <a:t>, </a:t>
+            </a:r>
+            <a:r>
+              <a:rPr lang="pt-BR" dirty="0" err="1" smtClean="0"/>
+              <a:t>large</a:t>
+            </a:r>
+            <a:r>
+              <a:rPr lang="pt-BR" dirty="0" smtClean="0"/>
+              <a:t>, </a:t>
+            </a:r>
+            <a:r>
+              <a:rPr lang="pt-BR" dirty="0" err="1" smtClean="0"/>
+              <a:t>huge</a:t>
+            </a:r>
+            <a:endParaRPr lang="pt-BR" dirty="0" smtClean="0"/>
+          </a:p>
+          <a:p>
+            <a:pPr lvl="1"/>
+            <a:r>
+              <a:rPr lang="pt-BR" dirty="0" smtClean="0"/>
+              <a:t>Podem ser usadas para especificar o modelo para cada função</a:t>
+            </a:r>
+          </a:p>
+          <a:p>
+            <a:pPr lvl="1"/>
+            <a:r>
+              <a:rPr lang="pt-BR" dirty="0" smtClean="0"/>
+              <a:t>Exemplo: </a:t>
+            </a:r>
+            <a:r>
+              <a:rPr lang="pt-BR" dirty="0" smtClean="0"/>
+              <a:t>	</a:t>
+            </a:r>
+            <a:r>
+              <a:rPr lang="pt-BR" dirty="0" err="1" smtClean="0"/>
+              <a:t>void</a:t>
+            </a:r>
+            <a:r>
+              <a:rPr lang="pt-BR" dirty="0" smtClean="0"/>
+              <a:t> </a:t>
+            </a:r>
+            <a:r>
+              <a:rPr lang="pt-BR" dirty="0" err="1" smtClean="0"/>
+              <a:t>foo</a:t>
+            </a:r>
+            <a:r>
+              <a:rPr lang="pt-BR" dirty="0" smtClean="0"/>
+              <a:t>(</a:t>
+            </a:r>
+            <a:r>
+              <a:rPr lang="pt-BR" dirty="0" err="1" smtClean="0"/>
+              <a:t>void</a:t>
+            </a:r>
+            <a:r>
+              <a:rPr lang="pt-BR" dirty="0" smtClean="0"/>
+              <a:t>) </a:t>
+            </a:r>
+            <a:r>
+              <a:rPr lang="pt-BR" dirty="0" smtClean="0"/>
+              <a:t>small</a:t>
+            </a:r>
+          </a:p>
+          <a:p>
+            <a:pPr lvl="1">
+              <a:buNone/>
+            </a:pPr>
+            <a:r>
+              <a:rPr lang="pt-BR" dirty="0" smtClean="0"/>
+              <a:t>	</a:t>
+            </a:r>
+            <a:r>
+              <a:rPr lang="pt-BR" dirty="0" smtClean="0"/>
+              <a:t>			{ for </a:t>
+            </a:r>
+            <a:r>
+              <a:rPr lang="pt-BR" dirty="0" smtClean="0"/>
+              <a:t>(i=8;i&gt;0;i--) { </a:t>
+            </a:r>
+            <a:endParaRPr lang="pt-BR" dirty="0" smtClean="0"/>
+          </a:p>
+          <a:p>
+            <a:pPr lvl="1">
+              <a:buNone/>
+            </a:pPr>
+            <a:r>
+              <a:rPr lang="pt-BR" dirty="0" smtClean="0"/>
+              <a:t>	</a:t>
+            </a:r>
+            <a:r>
+              <a:rPr lang="pt-BR" dirty="0" smtClean="0"/>
+              <a:t>			P1.2 </a:t>
+            </a:r>
+            <a:r>
+              <a:rPr lang="pt-BR" dirty="0" smtClean="0"/>
+              <a:t>= ~P1.2; } </a:t>
+            </a:r>
+            <a:r>
+              <a:rPr lang="pt-BR" dirty="0" smtClean="0"/>
+              <a:t> }</a:t>
+            </a:r>
+            <a:endParaRPr lang="pt-BR" dirty="0" smtClean="0"/>
+          </a:p>
+          <a:p>
+            <a:endParaRPr lang="pt-BR" dirty="0"/>
+          </a:p>
+        </p:txBody>
+      </p:sp>
+      <p:pic>
+        <p:nvPicPr>
+          <p:cNvPr id="6" name="Picture 2"/>
+          <p:cNvPicPr>
+            <a:picLocks noChangeAspect="1" noChangeArrowheads="1"/>
+          </p:cNvPicPr>
+          <p:nvPr/>
+        </p:nvPicPr>
+        <p:blipFill>
+          <a:blip r:embed="rId2" cstate="print"/>
+          <a:srcRect l="21870" t="40022" r="49780" b="38128"/>
+          <a:stretch>
+            <a:fillRect/>
+          </a:stretch>
+        </p:blipFill>
+        <p:spPr bwMode="auto">
+          <a:xfrm>
+            <a:off x="1259632" y="2708920"/>
+            <a:ext cx="3489619" cy="1512168"/>
+          </a:xfrm>
+          <a:prstGeom prst="rect">
+            <a:avLst/>
+          </a:prstGeom>
+          <a:noFill/>
+          <a:ln w="9525">
+            <a:noFill/>
+            <a:miter lim="800000"/>
+            <a:headEnd/>
+            <a:tailEnd/>
+          </a:ln>
+        </p:spPr>
+      </p:pic>
+      <p:pic>
+        <p:nvPicPr>
+          <p:cNvPr id="7" name="Picture 2"/>
+          <p:cNvPicPr>
+            <a:picLocks noChangeAspect="1" noChangeArrowheads="1"/>
+          </p:cNvPicPr>
+          <p:nvPr/>
+        </p:nvPicPr>
+        <p:blipFill>
+          <a:blip r:embed="rId3" cstate="print"/>
+          <a:srcRect l="12448" t="45891" r="75376" b="24578"/>
+          <a:stretch>
+            <a:fillRect/>
+          </a:stretch>
+        </p:blipFill>
+        <p:spPr bwMode="auto">
+          <a:xfrm>
+            <a:off x="5868144" y="1052736"/>
+            <a:ext cx="1584176" cy="2160240"/>
+          </a:xfrm>
+          <a:prstGeom prst="rect">
+            <a:avLst/>
+          </a:prstGeom>
+          <a:noFill/>
+          <a:ln w="9525">
+            <a:noFill/>
+            <a:miter lim="800000"/>
+            <a:headEnd/>
+            <a:tailEnd/>
+          </a:ln>
+        </p:spPr>
+      </p:pic>
+      <p:sp>
+        <p:nvSpPr>
+          <p:cNvPr id="8" name="CaixaDeTexto 7"/>
+          <p:cNvSpPr txBox="1"/>
+          <p:nvPr/>
+        </p:nvSpPr>
+        <p:spPr>
+          <a:xfrm>
+            <a:off x="5580112" y="3212976"/>
+            <a:ext cx="2213811" cy="369332"/>
+          </a:xfrm>
+          <a:prstGeom prst="rect">
+            <a:avLst/>
+          </a:prstGeom>
+          <a:noFill/>
+        </p:spPr>
+        <p:txBody>
+          <a:bodyPr wrap="none" rtlCol="0">
+            <a:spAutoFit/>
+          </a:bodyPr>
+          <a:lstStyle/>
+          <a:p>
+            <a:r>
+              <a:rPr lang="pt-BR" dirty="0" smtClean="0"/>
+              <a:t>Intel Memory </a:t>
+            </a:r>
+            <a:r>
+              <a:rPr lang="pt-BR" dirty="0" err="1" smtClean="0"/>
+              <a:t>Models</a:t>
+            </a:r>
+            <a:endParaRPr lang="pt-BR" dirty="0"/>
           </a:p>
         </p:txBody>
       </p:sp>
     </p:spTree>
     <p:extLst>
       <p:ext uri="{BB962C8B-B14F-4D97-AF65-F5344CB8AC3E}">
-        <p14:creationId xmlns:p14="http://schemas.microsoft.com/office/powerpoint/2010/main" xmlns="" val="3480651843"/>
+        <p14:creationId xmlns:p14="http://schemas.microsoft.com/office/powerpoint/2010/main" xmlns="" val="1443271526"/>
       </p:ext>
     </p:extLst>
   </p:cSld>
@@ -4713,7 +5328,7 @@
       </p:grpSpPr>
       <p:sp>
         <p:nvSpPr>
-          <p:cNvPr id="2" name="Title 1"/>
+          <p:cNvPr id="4" name="Title 3"/>
           <p:cNvSpPr>
             <a:spLocks noGrp="1"/>
           </p:cNvSpPr>
@@ -4727,38 +5342,36 @@
           <a:lstStyle/>
           <a:p>
             <a:r>
-              <a:rPr lang="pt-BR" sz="4000" dirty="0" smtClean="0"/>
-              <a:t>Estudo de caso - ???</a:t>
-            </a:r>
-            <a:endParaRPr lang="en-US" sz="4000" dirty="0"/>
-          </a:p>
-        </p:txBody>
-      </p:sp>
-      <p:sp>
-        <p:nvSpPr>
-          <p:cNvPr id="3" name="Content Placeholder 2"/>
-          <p:cNvSpPr>
-            <a:spLocks noGrp="1"/>
-          </p:cNvSpPr>
-          <p:nvPr>
-            <p:ph idx="1"/>
+              <a:rPr lang="pt-BR" dirty="0" smtClean="0"/>
+              <a:t>conclusão</a:t>
+            </a:r>
+            <a:endParaRPr lang="en-US" dirty="0"/>
+          </a:p>
+        </p:txBody>
+      </p:sp>
+      <p:sp>
+        <p:nvSpPr>
+          <p:cNvPr id="5" name="Text Placeholder 4"/>
+          <p:cNvSpPr>
+            <a:spLocks noGrp="1"/>
+          </p:cNvSpPr>
+          <p:nvPr>
+            <p:ph type="body" idx="1"/>
           </p:nvPr>
         </p:nvSpPr>
         <p:spPr/>
         <p:txBody>
-          <a:bodyPr>
-            <a:normAutofit/>
-          </a:bodyPr>
-          <a:lstStyle/>
-          <a:p>
-            <a:endParaRPr lang="pt-BR" dirty="0" smtClean="0"/>
+          <a:bodyPr/>
+          <a:lstStyle/>
+          <a:p>
+            <a:endParaRPr lang="en-US"/>
           </a:p>
         </p:txBody>
       </p:sp>
     </p:spTree>
     <p:extLst>
       <p:ext uri="{BB962C8B-B14F-4D97-AF65-F5344CB8AC3E}">
-        <p14:creationId xmlns:p14="http://schemas.microsoft.com/office/powerpoint/2010/main" xmlns="" val="3522577388"/>
+        <p14:creationId xmlns="" xmlns:p14="http://schemas.microsoft.com/office/powerpoint/2010/main" val="3480651843"/>
       </p:ext>
     </p:extLst>
   </p:cSld>
@@ -4808,6 +5421,87 @@
           <a:lstStyle/>
           <a:p>
             <a:r>
+              <a:rPr lang="pt-BR" sz="4000" dirty="0" smtClean="0"/>
+              <a:t>Estudo de caso - ???</a:t>
+            </a:r>
+            <a:endParaRPr lang="en-US" sz="4000" dirty="0"/>
+          </a:p>
+        </p:txBody>
+      </p:sp>
+      <p:sp>
+        <p:nvSpPr>
+          <p:cNvPr id="3" name="Content Placeholder 2"/>
+          <p:cNvSpPr>
+            <a:spLocks noGrp="1"/>
+          </p:cNvSpPr>
+          <p:nvPr>
+            <p:ph idx="1"/>
+          </p:nvPr>
+        </p:nvSpPr>
+        <p:spPr/>
+        <p:txBody>
+          <a:bodyPr>
+            <a:normAutofit/>
+          </a:bodyPr>
+          <a:lstStyle/>
+          <a:p>
+            <a:endParaRPr lang="pt-BR" dirty="0" smtClean="0"/>
+          </a:p>
+        </p:txBody>
+      </p:sp>
+    </p:spTree>
+    <p:extLst>
+      <p:ext uri="{BB962C8B-B14F-4D97-AF65-F5344CB8AC3E}">
+        <p14:creationId xmlns="" xmlns:p14="http://schemas.microsoft.com/office/powerpoint/2010/main" val="3522577388"/>
+      </p:ext>
+    </p:extLst>
+  </p:cSld>
+  <p:clrMapOvr>
+    <a:masterClrMapping/>
+  </p:clrMapOvr>
+  <p:timing>
+    <p:tnLst>
+      <p:par>
+        <p:cTn id="1" dur="indefinite" restart="never" nodeType="tmRoot"/>
+      </p:par>
+    </p:tnLst>
+  </p:timing>
+</p:sld>
+</file>
+
+<file path=ppt/slides/slide19.xml><?xml version="1.0" encoding="utf-8"?>
+<p:sld xmlns:a="http://schemas.openxmlformats.org/drawingml/2006/main" xmlns:r="http://schemas.openxmlformats.org/officeDocument/2006/relationships" xmlns:p="http://schemas.openxmlformats.org/presentationml/2006/main">
+  <p:cSld>
+    <p:spTree>
+      <p:nvGrpSpPr>
+        <p:cNvPr id="1" name=""/>
+        <p:cNvGrpSpPr/>
+        <p:nvPr/>
+      </p:nvGrpSpPr>
+      <p:grpSpPr>
+        <a:xfrm>
+          <a:off x="0" y="0"/>
+          <a:ext cx="0" cy="0"/>
+          <a:chOff x="0" y="0"/>
+          <a:chExt cx="0" cy="0"/>
+        </a:xfrm>
+      </p:grpSpPr>
+      <p:sp>
+        <p:nvSpPr>
+          <p:cNvPr id="2" name="Title 1"/>
+          <p:cNvSpPr>
+            <a:spLocks noGrp="1"/>
+          </p:cNvSpPr>
+          <p:nvPr>
+            <p:ph type="title"/>
+          </p:nvPr>
+        </p:nvSpPr>
+        <p:spPr/>
+        <p:txBody>
+          <a:bodyPr/>
+          <a:lstStyle/>
+          <a:p>
+            <a:r>
               <a:rPr lang="pt-BR" dirty="0" smtClean="0"/>
               <a:t>Perguntas</a:t>
             </a:r>
@@ -4846,7 +5540,7 @@
           <a:blip r:embed="rId2" cstate="print">
             <a:extLst>
               <a:ext uri="{28A0092B-C50C-407E-A947-70E740481C1C}">
-                <a14:useLocalDpi xmlns:a14="http://schemas.microsoft.com/office/drawing/2010/main" xmlns="" val="0"/>
+                <a14:useLocalDpi xmlns="" xmlns:a14="http://schemas.microsoft.com/office/drawing/2010/main" val="0"/>
               </a:ext>
             </a:extLst>
           </a:blip>
@@ -4866,7 +5560,7 @@
           <a:noFill/>
           <a:extLst>
             <a:ext uri="{909E8E84-426E-40DD-AFC4-6F175D3DCCD1}">
-              <a14:hiddenFill xmlns:a14="http://schemas.microsoft.com/office/drawing/2010/main" xmlns="">
+              <a14:hiddenFill xmlns="" xmlns:a14="http://schemas.microsoft.com/office/drawing/2010/main">
                 <a:solidFill>
                   <a:srgbClr val="FFFFFF"/>
                 </a:solidFill>
@@ -4878,7 +5572,7 @@
     </p:spTree>
     <p:extLst>
       <p:ext uri="{BB962C8B-B14F-4D97-AF65-F5344CB8AC3E}">
-        <p14:creationId xmlns:p14="http://schemas.microsoft.com/office/powerpoint/2010/main" xmlns="" val="575131698"/>
+        <p14:creationId xmlns="" xmlns:p14="http://schemas.microsoft.com/office/powerpoint/2010/main" val="575131698"/>
       </p:ext>
     </p:extLst>
   </p:cSld>
@@ -5072,7 +5766,7 @@
     </p:spTree>
     <p:extLst>
       <p:ext uri="{BB962C8B-B14F-4D97-AF65-F5344CB8AC3E}">
-        <p14:creationId xmlns:p14="http://schemas.microsoft.com/office/powerpoint/2010/main" xmlns="" val="460233177"/>
+        <p14:creationId xmlns="" xmlns:p14="http://schemas.microsoft.com/office/powerpoint/2010/main" val="460233177"/>
       </p:ext>
     </p:extLst>
   </p:cSld>
@@ -5151,7 +5845,7 @@
     </p:spTree>
     <p:extLst>
       <p:ext uri="{BB962C8B-B14F-4D97-AF65-F5344CB8AC3E}">
-        <p14:creationId xmlns:p14="http://schemas.microsoft.com/office/powerpoint/2010/main" xmlns="" val="820920551"/>
+        <p14:creationId xmlns="" xmlns:p14="http://schemas.microsoft.com/office/powerpoint/2010/main" val="820920551"/>
       </p:ext>
     </p:extLst>
   </p:cSld>
@@ -5271,7 +5965,7 @@
     </p:spTree>
     <p:extLst>
       <p:ext uri="{BB962C8B-B14F-4D97-AF65-F5344CB8AC3E}">
-        <p14:creationId xmlns:p14="http://schemas.microsoft.com/office/powerpoint/2010/main" xmlns="" val="3058117082"/>
+        <p14:creationId xmlns="" xmlns:p14="http://schemas.microsoft.com/office/powerpoint/2010/main" val="3058117082"/>
       </p:ext>
     </p:extLst>
   </p:cSld>
@@ -5361,7 +6055,7 @@
     </p:spTree>
     <p:extLst>
       <p:ext uri="{BB962C8B-B14F-4D97-AF65-F5344CB8AC3E}">
-        <p14:creationId xmlns:p14="http://schemas.microsoft.com/office/powerpoint/2010/main" xmlns="" val="3480651843"/>
+        <p14:creationId xmlns="" xmlns:p14="http://schemas.microsoft.com/office/powerpoint/2010/main" val="3480651843"/>
       </p:ext>
     </p:extLst>
   </p:cSld>
@@ -5490,11 +6184,7 @@
             </a:r>
             <a:r>
               <a:rPr lang="pt-BR" dirty="0" smtClean="0"/>
-              <a:t>(); e deve-se colocar seu protótipo no início do </a:t>
-            </a:r>
-            <a:r>
-              <a:rPr lang="pt-BR" dirty="0" smtClean="0"/>
-              <a:t>programa</a:t>
+              <a:t>(); e deve-se colocar seu protótipo no início do programa</a:t>
             </a:r>
           </a:p>
           <a:p>
@@ -5613,11 +6303,7 @@
           <a:p>
             <a:r>
               <a:rPr lang="pt-BR" dirty="0" smtClean="0"/>
-              <a:t>Para </a:t>
-            </a:r>
-            <a:r>
-              <a:rPr lang="pt-BR" dirty="0" smtClean="0"/>
-              <a:t>chamar do </a:t>
+              <a:t>Para chamar do </a:t>
             </a:r>
             <a:r>
               <a:rPr lang="pt-BR" dirty="0" err="1" smtClean="0"/>
@@ -5775,11 +6461,7 @@
           <a:p>
             <a:r>
               <a:rPr lang="en-US" dirty="0" smtClean="0"/>
-              <a:t>#</a:t>
-            </a:r>
-            <a:r>
-              <a:rPr lang="en-US" dirty="0" smtClean="0"/>
-              <a:t>include &lt;</a:t>
+              <a:t>#include &lt;</a:t>
             </a:r>
             <a:r>
               <a:rPr lang="en-US" dirty="0" err="1" smtClean="0"/>

</xml_diff>